<commit_message>
presentation fix with system block diagram
</commit_message>
<xml_diff>
--- a/Phase01_Doc/Presentation/Presentation_20151117.pptx
+++ b/Phase01_Doc/Presentation/Presentation_20151117.pptx
@@ -6,9 +6,9 @@
   </p:sldMasterIdLst>
   <p:sldIdLst>
     <p:sldId id="256" r:id="rId2"/>
-    <p:sldId id="262" r:id="rId3"/>
-    <p:sldId id="258" r:id="rId4"/>
-    <p:sldId id="259" r:id="rId5"/>
+    <p:sldId id="258" r:id="rId3"/>
+    <p:sldId id="259" r:id="rId4"/>
+    <p:sldId id="266" r:id="rId5"/>
     <p:sldId id="257" r:id="rId6"/>
     <p:sldId id="263" r:id="rId7"/>
     <p:sldId id="260" r:id="rId8"/>
@@ -281,11 +281,11 @@
         </c:dLbls>
         <c:marker val="1"/>
         <c:smooth val="0"/>
-        <c:axId val="2111153144"/>
-        <c:axId val="2111161880"/>
+        <c:axId val="2118399608"/>
+        <c:axId val="2118403080"/>
       </c:lineChart>
       <c:catAx>
-        <c:axId val="2111153144"/>
+        <c:axId val="2118399608"/>
         <c:scaling>
           <c:orientation val="minMax"/>
         </c:scaling>
@@ -323,7 +323,7 @@
             <a:endParaRPr lang="zh-TW"/>
           </a:p>
         </c:txPr>
-        <c:crossAx val="2111161880"/>
+        <c:crossAx val="2118403080"/>
         <c:crosses val="autoZero"/>
         <c:auto val="1"/>
         <c:lblAlgn val="ctr"/>
@@ -331,7 +331,7 @@
         <c:noMultiLvlLbl val="0"/>
       </c:catAx>
       <c:valAx>
-        <c:axId val="2111161880"/>
+        <c:axId val="2118403080"/>
         <c:scaling>
           <c:orientation val="minMax"/>
         </c:scaling>
@@ -376,7 +376,7 @@
             <a:endParaRPr lang="zh-TW"/>
           </a:p>
         </c:txPr>
-        <c:crossAx val="2111153144"/>
+        <c:crossAx val="2118399608"/>
         <c:crossesAt val="1.0"/>
         <c:crossBetween val="midCat"/>
       </c:valAx>
@@ -587,11 +587,11 @@
         </c:dLbls>
         <c:marker val="1"/>
         <c:smooth val="0"/>
-        <c:axId val="2111224552"/>
-        <c:axId val="2111227960"/>
+        <c:axId val="2110221496"/>
+        <c:axId val="2110224920"/>
       </c:lineChart>
       <c:catAx>
-        <c:axId val="2111224552"/>
+        <c:axId val="2110221496"/>
         <c:scaling>
           <c:orientation val="minMax"/>
         </c:scaling>
@@ -629,7 +629,7 @@
             <a:endParaRPr lang="zh-TW"/>
           </a:p>
         </c:txPr>
-        <c:crossAx val="2111227960"/>
+        <c:crossAx val="2110224920"/>
         <c:crosses val="autoZero"/>
         <c:auto val="1"/>
         <c:lblAlgn val="ctr"/>
@@ -637,7 +637,7 @@
         <c:noMultiLvlLbl val="0"/>
       </c:catAx>
       <c:valAx>
-        <c:axId val="2111227960"/>
+        <c:axId val="2110224920"/>
         <c:scaling>
           <c:orientation val="minMax"/>
         </c:scaling>
@@ -682,7 +682,7 @@
             <a:endParaRPr lang="zh-TW"/>
           </a:p>
         </c:txPr>
-        <c:crossAx val="2111224552"/>
+        <c:crossAx val="2110221496"/>
         <c:crossesAt val="1.0"/>
         <c:crossBetween val="midCat"/>
       </c:valAx>
@@ -893,11 +893,11 @@
         </c:dLbls>
         <c:marker val="1"/>
         <c:smooth val="0"/>
-        <c:axId val="2111259768"/>
-        <c:axId val="2111263176"/>
+        <c:axId val="2113992504"/>
+        <c:axId val="2116583480"/>
       </c:lineChart>
       <c:catAx>
-        <c:axId val="2111259768"/>
+        <c:axId val="2113992504"/>
         <c:scaling>
           <c:orientation val="minMax"/>
         </c:scaling>
@@ -935,7 +935,7 @@
             <a:endParaRPr lang="zh-TW"/>
           </a:p>
         </c:txPr>
-        <c:crossAx val="2111263176"/>
+        <c:crossAx val="2116583480"/>
         <c:crosses val="autoZero"/>
         <c:auto val="1"/>
         <c:lblAlgn val="ctr"/>
@@ -943,7 +943,7 @@
         <c:noMultiLvlLbl val="0"/>
       </c:catAx>
       <c:valAx>
-        <c:axId val="2111263176"/>
+        <c:axId val="2116583480"/>
         <c:scaling>
           <c:orientation val="minMax"/>
         </c:scaling>
@@ -988,7 +988,7 @@
             <a:endParaRPr lang="zh-TW"/>
           </a:p>
         </c:txPr>
-        <c:crossAx val="2111259768"/>
+        <c:crossAx val="2113992504"/>
         <c:crossesAt val="1.0"/>
         <c:crossBetween val="midCat"/>
       </c:valAx>
@@ -1249,11 +1249,11 @@
         </c:dLbls>
         <c:gapWidth val="219"/>
         <c:overlap val="-27"/>
-        <c:axId val="2111304904"/>
-        <c:axId val="2111307960"/>
+        <c:axId val="2066591192"/>
+        <c:axId val="2114001848"/>
       </c:barChart>
       <c:catAx>
-        <c:axId val="2111304904"/>
+        <c:axId val="2066591192"/>
         <c:scaling>
           <c:orientation val="minMax"/>
         </c:scaling>
@@ -1262,7 +1262,7 @@
         <c:majorTickMark val="out"/>
         <c:minorTickMark val="none"/>
         <c:tickLblPos val="nextTo"/>
-        <c:crossAx val="2111307960"/>
+        <c:crossAx val="2114001848"/>
         <c:crosses val="autoZero"/>
         <c:auto val="1"/>
         <c:lblAlgn val="ctr"/>
@@ -1270,7 +1270,7 @@
         <c:noMultiLvlLbl val="0"/>
       </c:catAx>
       <c:valAx>
-        <c:axId val="2111307960"/>
+        <c:axId val="2114001848"/>
         <c:scaling>
           <c:orientation val="minMax"/>
         </c:scaling>
@@ -1347,7 +1347,7 @@
             <a:endParaRPr lang="zh-TW"/>
           </a:p>
         </c:txPr>
-        <c:crossAx val="2111304904"/>
+        <c:crossAx val="2066591192"/>
         <c:crosses val="autoZero"/>
         <c:crossBetween val="between"/>
       </c:valAx>
@@ -4652,13 +4652,13 @@
   <p:clrMapOvr>
     <a:masterClrMapping/>
   </p:clrMapOvr>
-  <mc:AlternateContent xmlns:mc="http://schemas.openxmlformats.org/markup-compatibility/2006">
-    <mc:Choice xmlns:p14="http://schemas.microsoft.com/office/powerpoint/2010/main" Requires="p14">
+  <mc:AlternateContent xmlns:mc="http://schemas.openxmlformats.org/markup-compatibility/2006" xmlns:p14="http://schemas.microsoft.com/office/powerpoint/2010/main">
+    <mc:Choice Requires="p14">
       <p:transition spd="med" p14:dur="700">
         <p:fade/>
       </p:transition>
     </mc:Choice>
-    <mc:Fallback>
+    <mc:Fallback xmlns="">
       <p:transition xmlns:p14="http://schemas.microsoft.com/office/powerpoint/2010/main" spd="med">
         <p:fade/>
       </p:transition>
@@ -4711,7 +4711,7 @@
                 <a:latin typeface="PingFang TC Regular"/>
                 <a:cs typeface="PingFang TC Regular"/>
               </a:rPr>
-              <a:t>System Block Diagram</a:t>
+              <a:t>WBS</a:t>
             </a:r>
             <a:endParaRPr kumimoji="1" lang="zh-TW" altLang="en-US" dirty="0">
               <a:latin typeface="PingFang TC Regular"/>
@@ -4722,7 +4722,7 @@
       </p:sp>
       <p:pic>
         <p:nvPicPr>
-          <p:cNvPr id="5" name="圖片 4" descr="螢幕快照 2015-11-17 01.15.20.png"/>
+          <p:cNvPr id="6" name="圖片 5" descr="螢幕快照 2015-11-17 00.23.19.png"/>
           <p:cNvPicPr>
             <a:picLocks noChangeAspect="1"/>
           </p:cNvPicPr>
@@ -4742,8 +4742,8 @@
         </p:blipFill>
         <p:spPr>
           <a:xfrm>
-            <a:off x="1784195" y="1290019"/>
-            <a:ext cx="5413067" cy="5356326"/>
+            <a:off x="1522855" y="1205983"/>
+            <a:ext cx="6081481" cy="5440361"/>
           </a:xfrm>
           <a:prstGeom prst="rect">
             <a:avLst/>
@@ -4929,20 +4929,20 @@
     </p:spTree>
     <p:extLst>
       <p:ext uri="{BB962C8B-B14F-4D97-AF65-F5344CB8AC3E}">
-        <p14:creationId xmlns:p14="http://schemas.microsoft.com/office/powerpoint/2010/main" val="571387818"/>
+        <p14:creationId xmlns:p14="http://schemas.microsoft.com/office/powerpoint/2010/main" val="2553982274"/>
       </p:ext>
     </p:extLst>
   </p:cSld>
   <p:clrMapOvr>
     <a:masterClrMapping/>
   </p:clrMapOvr>
-  <mc:AlternateContent xmlns:mc="http://schemas.openxmlformats.org/markup-compatibility/2006">
-    <mc:Choice xmlns:p14="http://schemas.microsoft.com/office/powerpoint/2010/main" Requires="p14">
+  <mc:AlternateContent xmlns:mc="http://schemas.openxmlformats.org/markup-compatibility/2006" xmlns:p14="http://schemas.microsoft.com/office/powerpoint/2010/main">
+    <mc:Choice Requires="p14">
       <p:transition spd="med" p14:dur="700">
         <p:fade/>
       </p:transition>
     </mc:Choice>
-    <mc:Fallback>
+    <mc:Fallback xmlns="">
       <p:transition xmlns:p14="http://schemas.microsoft.com/office/powerpoint/2010/main" spd="med">
         <p:fade/>
       </p:transition>
@@ -4995,7 +4995,7 @@
                 <a:latin typeface="PingFang TC Regular"/>
                 <a:cs typeface="PingFang TC Regular"/>
               </a:rPr>
-              <a:t>WBS</a:t>
+              <a:t>Task Assignments</a:t>
             </a:r>
             <a:endParaRPr kumimoji="1" lang="zh-TW" altLang="en-US" dirty="0">
               <a:latin typeface="PingFang TC Regular"/>
@@ -5006,7 +5006,7 @@
       </p:sp>
       <p:pic>
         <p:nvPicPr>
-          <p:cNvPr id="6" name="圖片 5" descr="螢幕快照 2015-11-17 00.23.19.png"/>
+          <p:cNvPr id="4" name="圖片 3" descr="螢幕快照 2015-11-17 00.26.58.png"/>
           <p:cNvPicPr>
             <a:picLocks noChangeAspect="1"/>
           </p:cNvPicPr>
@@ -5026,8 +5026,8 @@
         </p:blipFill>
         <p:spPr>
           <a:xfrm>
-            <a:off x="1522855" y="1205983"/>
-            <a:ext cx="6081481" cy="5440361"/>
+            <a:off x="2736137" y="1417638"/>
+            <a:ext cx="3654480" cy="5215784"/>
           </a:xfrm>
           <a:prstGeom prst="rect">
             <a:avLst/>
@@ -5036,7 +5036,7 @@
       </p:pic>
       <p:sp>
         <p:nvSpPr>
-          <p:cNvPr id="4" name="子標題 2"/>
+          <p:cNvPr id="5" name="子標題 2"/>
           <p:cNvSpPr txBox="1">
             <a:spLocks/>
           </p:cNvSpPr>
@@ -5213,20 +5213,20 @@
     </p:spTree>
     <p:extLst>
       <p:ext uri="{BB962C8B-B14F-4D97-AF65-F5344CB8AC3E}">
-        <p14:creationId xmlns:p14="http://schemas.microsoft.com/office/powerpoint/2010/main" val="2553982274"/>
+        <p14:creationId xmlns:p14="http://schemas.microsoft.com/office/powerpoint/2010/main" val="3412706670"/>
       </p:ext>
     </p:extLst>
   </p:cSld>
   <p:clrMapOvr>
     <a:masterClrMapping/>
   </p:clrMapOvr>
-  <mc:AlternateContent xmlns:mc="http://schemas.openxmlformats.org/markup-compatibility/2006">
-    <mc:Choice xmlns:p14="http://schemas.microsoft.com/office/powerpoint/2010/main" Requires="p14">
+  <mc:AlternateContent xmlns:mc="http://schemas.openxmlformats.org/markup-compatibility/2006" xmlns:p14="http://schemas.microsoft.com/office/powerpoint/2010/main">
+    <mc:Choice Requires="p14">
       <p:transition spd="med" p14:dur="700">
         <p:fade/>
       </p:transition>
     </mc:Choice>
-    <mc:Fallback>
+    <mc:Fallback xmlns="">
       <p:transition xmlns:p14="http://schemas.microsoft.com/office/powerpoint/2010/main" spd="med">
         <p:fade/>
       </p:transition>
@@ -5275,11 +5275,11 @@
           <a:lstStyle/>
           <a:p>
             <a:r>
-              <a:rPr kumimoji="1" lang="en-US" altLang="zh-TW" dirty="0">
+              <a:rPr kumimoji="1" lang="en-US" altLang="zh-TW" dirty="0" smtClean="0">
                 <a:latin typeface="PingFang TC Regular"/>
                 <a:cs typeface="PingFang TC Regular"/>
               </a:rPr>
-              <a:t>Task Assignments</a:t>
+              <a:t>System Block Diagram</a:t>
             </a:r>
             <a:endParaRPr kumimoji="1" lang="zh-TW" altLang="en-US" dirty="0">
               <a:latin typeface="PingFang TC Regular"/>
@@ -5288,39 +5288,9 @@
           </a:p>
         </p:txBody>
       </p:sp>
-      <p:pic>
-        <p:nvPicPr>
-          <p:cNvPr id="4" name="圖片 3" descr="螢幕快照 2015-11-17 00.26.58.png"/>
-          <p:cNvPicPr>
-            <a:picLocks noChangeAspect="1"/>
-          </p:cNvPicPr>
-          <p:nvPr/>
-        </p:nvPicPr>
-        <p:blipFill>
-          <a:blip r:embed="rId2">
-            <a:extLst>
-              <a:ext uri="{28A0092B-C50C-407E-A947-70E740481C1C}">
-                <a14:useLocalDpi xmlns:a14="http://schemas.microsoft.com/office/drawing/2010/main" val="0"/>
-              </a:ext>
-            </a:extLst>
-          </a:blip>
-          <a:stretch>
-            <a:fillRect/>
-          </a:stretch>
-        </p:blipFill>
-        <p:spPr>
-          <a:xfrm>
-            <a:off x="2736137" y="1417638"/>
-            <a:ext cx="3654480" cy="5215784"/>
-          </a:xfrm>
-          <a:prstGeom prst="rect">
-            <a:avLst/>
-          </a:prstGeom>
-        </p:spPr>
-      </p:pic>
-      <p:sp>
-        <p:nvSpPr>
-          <p:cNvPr id="5" name="子標題 2"/>
+      <p:sp>
+        <p:nvSpPr>
+          <p:cNvPr id="4" name="子標題 2"/>
           <p:cNvSpPr txBox="1">
             <a:spLocks/>
           </p:cNvSpPr>
@@ -5494,23 +5464,47 @@
           </a:p>
         </p:txBody>
       </p:sp>
+      <p:pic>
+        <p:nvPicPr>
+          <p:cNvPr id="3" name="圖片 2"/>
+          <p:cNvPicPr>
+            <a:picLocks noChangeAspect="1"/>
+          </p:cNvPicPr>
+          <p:nvPr/>
+        </p:nvPicPr>
+        <p:blipFill>
+          <a:blip r:embed="rId2"/>
+          <a:stretch>
+            <a:fillRect/>
+          </a:stretch>
+        </p:blipFill>
+        <p:spPr>
+          <a:xfrm>
+            <a:off x="1549400" y="1417638"/>
+            <a:ext cx="6045200" cy="4965700"/>
+          </a:xfrm>
+          <a:prstGeom prst="rect">
+            <a:avLst/>
+          </a:prstGeom>
+        </p:spPr>
+      </p:pic>
     </p:spTree>
     <p:extLst>
       <p:ext uri="{BB962C8B-B14F-4D97-AF65-F5344CB8AC3E}">
-        <p14:creationId xmlns:p14="http://schemas.microsoft.com/office/powerpoint/2010/main" val="3412706670"/>
+        <p14:creationId xmlns:p14="http://schemas.microsoft.com/office/powerpoint/2010/main" val="46793965"/>
       </p:ext>
     </p:extLst>
   </p:cSld>
   <p:clrMapOvr>
     <a:masterClrMapping/>
   </p:clrMapOvr>
-  <mc:AlternateContent xmlns:mc="http://schemas.openxmlformats.org/markup-compatibility/2006">
-    <mc:Choice xmlns:p14="http://schemas.microsoft.com/office/powerpoint/2010/main" Requires="p14">
+  <mc:AlternateContent xmlns:mc="http://schemas.openxmlformats.org/markup-compatibility/2006" xmlns:p14="http://schemas.microsoft.com/office/powerpoint/2010/main">
+    <mc:Choice Requires="p14">
       <p:transition spd="med" p14:dur="700">
         <p:fade/>
       </p:transition>
     </mc:Choice>
-    <mc:Fallback>
+    <mc:Fallback xmlns="">
       <p:transition xmlns:p14="http://schemas.microsoft.com/office/powerpoint/2010/main" spd="med">
         <p:fade/>
       </p:transition>
@@ -6368,13 +6362,13 @@
   <p:clrMapOvr>
     <a:masterClrMapping/>
   </p:clrMapOvr>
-  <mc:AlternateContent xmlns:mc="http://schemas.openxmlformats.org/markup-compatibility/2006">
-    <mc:Choice xmlns:p14="http://schemas.microsoft.com/office/powerpoint/2010/main" Requires="p14">
+  <mc:AlternateContent xmlns:mc="http://schemas.openxmlformats.org/markup-compatibility/2006" xmlns:p14="http://schemas.microsoft.com/office/powerpoint/2010/main">
+    <mc:Choice Requires="p14">
       <p:transition spd="med" p14:dur="700">
         <p:fade/>
       </p:transition>
     </mc:Choice>
-    <mc:Fallback>
+    <mc:Fallback xmlns="">
       <p:transition xmlns:p14="http://schemas.microsoft.com/office/powerpoint/2010/main" spd="med">
         <p:fade/>
       </p:transition>
@@ -6623,13 +6617,13 @@
   <p:clrMapOvr>
     <a:masterClrMapping/>
   </p:clrMapOvr>
-  <mc:AlternateContent xmlns:mc="http://schemas.openxmlformats.org/markup-compatibility/2006">
-    <mc:Choice xmlns:p14="http://schemas.microsoft.com/office/powerpoint/2010/main" Requires="p14">
+  <mc:AlternateContent xmlns:mc="http://schemas.openxmlformats.org/markup-compatibility/2006" xmlns:p14="http://schemas.microsoft.com/office/powerpoint/2010/main">
+    <mc:Choice Requires="p14">
       <p:transition spd="med" p14:dur="700">
         <p:fade/>
       </p:transition>
     </mc:Choice>
-    <mc:Fallback>
+    <mc:Fallback xmlns="">
       <p:transition xmlns:p14="http://schemas.microsoft.com/office/powerpoint/2010/main" spd="med">
         <p:fade/>
       </p:transition>
@@ -6907,13 +6901,13 @@
   <p:clrMapOvr>
     <a:masterClrMapping/>
   </p:clrMapOvr>
-  <mc:AlternateContent xmlns:mc="http://schemas.openxmlformats.org/markup-compatibility/2006">
-    <mc:Choice xmlns:p14="http://schemas.microsoft.com/office/powerpoint/2010/main" Requires="p14">
+  <mc:AlternateContent xmlns:mc="http://schemas.openxmlformats.org/markup-compatibility/2006" xmlns:p14="http://schemas.microsoft.com/office/powerpoint/2010/main">
+    <mc:Choice Requires="p14">
       <p:transition spd="med" p14:dur="700">
         <p:fade/>
       </p:transition>
     </mc:Choice>
-    <mc:Fallback>
+    <mc:Fallback xmlns="">
       <p:transition xmlns:p14="http://schemas.microsoft.com/office/powerpoint/2010/main" spd="med">
         <p:fade/>
       </p:transition>
@@ -7075,13 +7069,13 @@
   <p:clrMapOvr>
     <a:masterClrMapping/>
   </p:clrMapOvr>
-  <mc:AlternateContent xmlns:mc="http://schemas.openxmlformats.org/markup-compatibility/2006">
-    <mc:Choice xmlns:p14="http://schemas.microsoft.com/office/powerpoint/2010/main" Requires="p14">
+  <mc:AlternateContent xmlns:mc="http://schemas.openxmlformats.org/markup-compatibility/2006" xmlns:p14="http://schemas.microsoft.com/office/powerpoint/2010/main">
+    <mc:Choice Requires="p14">
       <p:transition spd="med" p14:dur="700">
         <p:fade/>
       </p:transition>
     </mc:Choice>
-    <mc:Fallback>
+    <mc:Fallback xmlns="">
       <p:transition xmlns:p14="http://schemas.microsoft.com/office/powerpoint/2010/main" spd="med">
         <p:fade/>
       </p:transition>
@@ -7334,13 +7328,13 @@
   <p:clrMapOvr>
     <a:masterClrMapping/>
   </p:clrMapOvr>
-  <mc:AlternateContent xmlns:mc="http://schemas.openxmlformats.org/markup-compatibility/2006">
-    <mc:Choice xmlns:p14="http://schemas.microsoft.com/office/powerpoint/2010/main" Requires="p14">
+  <mc:AlternateContent xmlns:mc="http://schemas.openxmlformats.org/markup-compatibility/2006" xmlns:p14="http://schemas.microsoft.com/office/powerpoint/2010/main">
+    <mc:Choice Requires="p14">
       <p:transition spd="med" p14:dur="700">
         <p:fade/>
       </p:transition>
     </mc:Choice>
-    <mc:Fallback>
+    <mc:Fallback xmlns="">
       <p:transition xmlns:p14="http://schemas.microsoft.com/office/powerpoint/2010/main" spd="med">
         <p:fade/>
       </p:transition>

</xml_diff>

<commit_message>
update burn down time
</commit_message>
<xml_diff>
--- a/Phase01_Doc/Presentation/Presentation_20151117.pptx
+++ b/Phase01_Doc/Presentation/Presentation_20151117.pptx
@@ -281,11 +281,11 @@
         </c:dLbls>
         <c:marker val="1"/>
         <c:smooth val="0"/>
-        <c:axId val="2118399608"/>
-        <c:axId val="2118403080"/>
+        <c:axId val="2093851784"/>
+        <c:axId val="2093855256"/>
       </c:lineChart>
       <c:catAx>
-        <c:axId val="2118399608"/>
+        <c:axId val="2093851784"/>
         <c:scaling>
           <c:orientation val="minMax"/>
         </c:scaling>
@@ -323,7 +323,7 @@
             <a:endParaRPr lang="zh-TW"/>
           </a:p>
         </c:txPr>
-        <c:crossAx val="2118403080"/>
+        <c:crossAx val="2093855256"/>
         <c:crosses val="autoZero"/>
         <c:auto val="1"/>
         <c:lblAlgn val="ctr"/>
@@ -331,7 +331,7 @@
         <c:noMultiLvlLbl val="0"/>
       </c:catAx>
       <c:valAx>
-        <c:axId val="2118403080"/>
+        <c:axId val="2093855256"/>
         <c:scaling>
           <c:orientation val="minMax"/>
         </c:scaling>
@@ -376,7 +376,7 @@
             <a:endParaRPr lang="zh-TW"/>
           </a:p>
         </c:txPr>
-        <c:crossAx val="2118399608"/>
+        <c:crossAx val="2093851784"/>
         <c:crossesAt val="1.0"/>
         <c:crossBetween val="midCat"/>
       </c:valAx>
@@ -587,11 +587,11 @@
         </c:dLbls>
         <c:marker val="1"/>
         <c:smooth val="0"/>
-        <c:axId val="2110221496"/>
-        <c:axId val="2110224920"/>
+        <c:axId val="2093920520"/>
+        <c:axId val="2093923992"/>
       </c:lineChart>
       <c:catAx>
-        <c:axId val="2110221496"/>
+        <c:axId val="2093920520"/>
         <c:scaling>
           <c:orientation val="minMax"/>
         </c:scaling>
@@ -629,7 +629,7 @@
             <a:endParaRPr lang="zh-TW"/>
           </a:p>
         </c:txPr>
-        <c:crossAx val="2110224920"/>
+        <c:crossAx val="2093923992"/>
         <c:crosses val="autoZero"/>
         <c:auto val="1"/>
         <c:lblAlgn val="ctr"/>
@@ -637,7 +637,7 @@
         <c:noMultiLvlLbl val="0"/>
       </c:catAx>
       <c:valAx>
-        <c:axId val="2110224920"/>
+        <c:axId val="2093923992"/>
         <c:scaling>
           <c:orientation val="minMax"/>
         </c:scaling>
@@ -682,7 +682,7 @@
             <a:endParaRPr lang="zh-TW"/>
           </a:p>
         </c:txPr>
-        <c:crossAx val="2110221496"/>
+        <c:crossAx val="2093920520"/>
         <c:crossesAt val="1.0"/>
         <c:crossBetween val="midCat"/>
       </c:valAx>
@@ -893,11 +893,11 @@
         </c:dLbls>
         <c:marker val="1"/>
         <c:smooth val="0"/>
-        <c:axId val="2113992504"/>
-        <c:axId val="2116583480"/>
+        <c:axId val="2093955736"/>
+        <c:axId val="2093959208"/>
       </c:lineChart>
       <c:catAx>
-        <c:axId val="2113992504"/>
+        <c:axId val="2093955736"/>
         <c:scaling>
           <c:orientation val="minMax"/>
         </c:scaling>
@@ -935,7 +935,7 @@
             <a:endParaRPr lang="zh-TW"/>
           </a:p>
         </c:txPr>
-        <c:crossAx val="2116583480"/>
+        <c:crossAx val="2093959208"/>
         <c:crosses val="autoZero"/>
         <c:auto val="1"/>
         <c:lblAlgn val="ctr"/>
@@ -943,7 +943,7 @@
         <c:noMultiLvlLbl val="0"/>
       </c:catAx>
       <c:valAx>
-        <c:axId val="2116583480"/>
+        <c:axId val="2093959208"/>
         <c:scaling>
           <c:orientation val="minMax"/>
         </c:scaling>
@@ -988,7 +988,7 @@
             <a:endParaRPr lang="zh-TW"/>
           </a:p>
         </c:txPr>
-        <c:crossAx val="2113992504"/>
+        <c:crossAx val="2093955736"/>
         <c:crossesAt val="1.0"/>
         <c:crossBetween val="midCat"/>
       </c:valAx>
@@ -1249,11 +1249,11 @@
         </c:dLbls>
         <c:gapWidth val="219"/>
         <c:overlap val="-27"/>
-        <c:axId val="2066591192"/>
-        <c:axId val="2114001848"/>
+        <c:axId val="2093312600"/>
+        <c:axId val="2093315656"/>
       </c:barChart>
       <c:catAx>
-        <c:axId val="2066591192"/>
+        <c:axId val="2093312600"/>
         <c:scaling>
           <c:orientation val="minMax"/>
         </c:scaling>
@@ -1262,7 +1262,7 @@
         <c:majorTickMark val="out"/>
         <c:minorTickMark val="none"/>
         <c:tickLblPos val="nextTo"/>
-        <c:crossAx val="2114001848"/>
+        <c:crossAx val="2093315656"/>
         <c:crosses val="autoZero"/>
         <c:auto val="1"/>
         <c:lblAlgn val="ctr"/>
@@ -1270,7 +1270,7 @@
         <c:noMultiLvlLbl val="0"/>
       </c:catAx>
       <c:valAx>
-        <c:axId val="2114001848"/>
+        <c:axId val="2093315656"/>
         <c:scaling>
           <c:orientation val="minMax"/>
         </c:scaling>
@@ -1347,7 +1347,7 @@
             <a:endParaRPr lang="zh-TW"/>
           </a:p>
         </c:txPr>
-        <c:crossAx val="2066591192"/>
+        <c:crossAx val="2093312600"/>
         <c:crosses val="autoZero"/>
         <c:crossBetween val="between"/>
       </c:valAx>
@@ -1610,7 +1610,7 @@
           <a:p>
             <a:fld id="{6BFECD78-3C8E-49F2-8FAB-59489D168ABB}" type="datetimeFigureOut">
               <a:rPr lang="en-US" smtClean="0"/>
-              <a:t>15/11/17</a:t>
+              <a:t>15/11/18</a:t>
             </a:fld>
             <a:endParaRPr lang="en-US"/>
           </a:p>
@@ -1780,7 +1780,7 @@
           <a:p>
             <a:fld id="{6BFECD78-3C8E-49F2-8FAB-59489D168ABB}" type="datetimeFigureOut">
               <a:rPr lang="en-US" smtClean="0"/>
-              <a:t>15/11/17</a:t>
+              <a:t>15/11/18</a:t>
             </a:fld>
             <a:endParaRPr lang="en-US"/>
           </a:p>
@@ -1960,7 +1960,7 @@
           <a:p>
             <a:fld id="{6BFECD78-3C8E-49F2-8FAB-59489D168ABB}" type="datetimeFigureOut">
               <a:rPr lang="en-US" smtClean="0"/>
-              <a:t>15/11/17</a:t>
+              <a:t>15/11/18</a:t>
             </a:fld>
             <a:endParaRPr lang="en-US"/>
           </a:p>
@@ -2130,7 +2130,7 @@
           <a:p>
             <a:fld id="{6BFECD78-3C8E-49F2-8FAB-59489D168ABB}" type="datetimeFigureOut">
               <a:rPr lang="en-US" smtClean="0"/>
-              <a:t>15/11/17</a:t>
+              <a:t>15/11/18</a:t>
             </a:fld>
             <a:endParaRPr lang="en-US"/>
           </a:p>
@@ -2376,7 +2376,7 @@
           <a:p>
             <a:fld id="{6BFECD78-3C8E-49F2-8FAB-59489D168ABB}" type="datetimeFigureOut">
               <a:rPr lang="en-US" smtClean="0"/>
-              <a:t>15/11/17</a:t>
+              <a:t>15/11/18</a:t>
             </a:fld>
             <a:endParaRPr lang="en-US"/>
           </a:p>
@@ -2664,7 +2664,7 @@
           <a:p>
             <a:fld id="{6BFECD78-3C8E-49F2-8FAB-59489D168ABB}" type="datetimeFigureOut">
               <a:rPr lang="en-US" smtClean="0"/>
-              <a:t>15/11/17</a:t>
+              <a:t>15/11/18</a:t>
             </a:fld>
             <a:endParaRPr lang="en-US"/>
           </a:p>
@@ -3086,7 +3086,7 @@
           <a:p>
             <a:fld id="{6BFECD78-3C8E-49F2-8FAB-59489D168ABB}" type="datetimeFigureOut">
               <a:rPr lang="en-US" smtClean="0"/>
-              <a:t>15/11/17</a:t>
+              <a:t>15/11/18</a:t>
             </a:fld>
             <a:endParaRPr lang="en-US"/>
           </a:p>
@@ -3204,7 +3204,7 @@
           <a:p>
             <a:fld id="{6BFECD78-3C8E-49F2-8FAB-59489D168ABB}" type="datetimeFigureOut">
               <a:rPr lang="en-US" smtClean="0"/>
-              <a:t>15/11/17</a:t>
+              <a:t>15/11/18</a:t>
             </a:fld>
             <a:endParaRPr lang="en-US"/>
           </a:p>
@@ -3299,7 +3299,7 @@
           <a:p>
             <a:fld id="{6BFECD78-3C8E-49F2-8FAB-59489D168ABB}" type="datetimeFigureOut">
               <a:rPr lang="en-US" smtClean="0"/>
-              <a:t>15/11/17</a:t>
+              <a:t>15/11/18</a:t>
             </a:fld>
             <a:endParaRPr lang="en-US"/>
           </a:p>
@@ -3576,7 +3576,7 @@
           <a:p>
             <a:fld id="{6BFECD78-3C8E-49F2-8FAB-59489D168ABB}" type="datetimeFigureOut">
               <a:rPr lang="en-US" smtClean="0"/>
-              <a:t>15/11/17</a:t>
+              <a:t>15/11/18</a:t>
             </a:fld>
             <a:endParaRPr lang="en-US"/>
           </a:p>
@@ -3829,7 +3829,7 @@
           <a:p>
             <a:fld id="{6BFECD78-3C8E-49F2-8FAB-59489D168ABB}" type="datetimeFigureOut">
               <a:rPr lang="en-US" smtClean="0"/>
-              <a:t>15/11/17</a:t>
+              <a:t>15/11/18</a:t>
             </a:fld>
             <a:endParaRPr lang="en-US"/>
           </a:p>
@@ -4042,7 +4042,7 @@
           <a:p>
             <a:fld id="{6BFECD78-3C8E-49F2-8FAB-59489D168ABB}" type="datetimeFigureOut">
               <a:rPr lang="en-US" smtClean="0"/>
-              <a:t>15/11/17</a:t>
+              <a:t>15/11/18</a:t>
             </a:fld>
             <a:endParaRPr lang="en-US"/>
           </a:p>
@@ -4987,15 +4987,17 @@
         </p:nvSpPr>
         <p:spPr/>
         <p:txBody>
-          <a:bodyPr/>
+          <a:bodyPr>
+            <a:normAutofit/>
+          </a:bodyPr>
           <a:lstStyle/>
           <a:p>
             <a:r>
-              <a:rPr kumimoji="1" lang="en-US" altLang="zh-TW" dirty="0">
+              <a:rPr kumimoji="1" lang="en-US" altLang="zh-TW" dirty="0" smtClean="0">
                 <a:latin typeface="PingFang TC Regular"/>
                 <a:cs typeface="PingFang TC Regular"/>
               </a:rPr>
-              <a:t>Task Assignments</a:t>
+              <a:t>WBS</a:t>
             </a:r>
             <a:endParaRPr kumimoji="1" lang="zh-TW" altLang="en-US" dirty="0">
               <a:latin typeface="PingFang TC Regular"/>

</xml_diff>